<commit_message>
updated links in the syllabus
</commit_message>
<xml_diff>
--- a/content/lectures/lecture1/presentation/lecture1_draft.pptx
+++ b/content/lectures/lecture1/presentation/lecture1_draft.pptx
@@ -28,7 +28,7 @@
       <p:italic r:id="rId13"/>
     </p:embeddedFont>
     <p:embeddedFont>
-      <p:font typeface="Karla" panose="020F0502020204030204" pitchFamily="2" charset="0"/>
+      <p:font typeface="Karla" pitchFamily="2" charset="0"/>
       <p:regular r:id="rId14"/>
       <p:bold r:id="rId15"/>
       <p:italic r:id="rId16"/>
@@ -130,6 +130,11 @@
       </a:defRPr>
     </a:lvl9pPr>
   </p:defaultTextStyle>
+  <p:extLst>
+    <p:ext uri="{EFAFB233-063F-42B5-8137-9DF3F51BA10A}">
+      <p15:sldGuideLst xmlns:p15="http://schemas.microsoft.com/office/powerpoint/2012/main"/>
+    </p:ext>
+  </p:extLst>
 </p:presentation>
 </file>
 
@@ -280,7 +285,7 @@
           <a:p>
             <a:fld id="{BD43FDEE-31B2-4A81-9764-6BBEE99A1C59}" type="datetimeFigureOut">
               <a:rPr lang="en-US" smtClean="0"/>
-              <a:t>1/23/2020</a:t>
+              <a:t>1/26/2020</a:t>
             </a:fld>
             <a:endParaRPr lang="en-US"/>
           </a:p>
@@ -478,7 +483,7 @@
           <a:p>
             <a:fld id="{BD43FDEE-31B2-4A81-9764-6BBEE99A1C59}" type="datetimeFigureOut">
               <a:rPr lang="en-US" smtClean="0"/>
-              <a:t>1/23/2020</a:t>
+              <a:t>1/26/2020</a:t>
             </a:fld>
             <a:endParaRPr lang="en-US"/>
           </a:p>
@@ -686,7 +691,7 @@
           <a:p>
             <a:fld id="{BD43FDEE-31B2-4A81-9764-6BBEE99A1C59}" type="datetimeFigureOut">
               <a:rPr lang="en-US" smtClean="0"/>
-              <a:t>1/23/2020</a:t>
+              <a:t>1/26/2020</a:t>
             </a:fld>
             <a:endParaRPr lang="en-US"/>
           </a:p>
@@ -884,7 +889,7 @@
           <a:p>
             <a:fld id="{BD43FDEE-31B2-4A81-9764-6BBEE99A1C59}" type="datetimeFigureOut">
               <a:rPr lang="en-US" smtClean="0"/>
-              <a:t>1/23/2020</a:t>
+              <a:t>1/26/2020</a:t>
             </a:fld>
             <a:endParaRPr lang="en-US"/>
           </a:p>
@@ -1159,7 +1164,7 @@
           <a:p>
             <a:fld id="{BD43FDEE-31B2-4A81-9764-6BBEE99A1C59}" type="datetimeFigureOut">
               <a:rPr lang="en-US" smtClean="0"/>
-              <a:t>1/23/2020</a:t>
+              <a:t>1/26/2020</a:t>
             </a:fld>
             <a:endParaRPr lang="en-US"/>
           </a:p>
@@ -1424,7 +1429,7 @@
           <a:p>
             <a:fld id="{BD43FDEE-31B2-4A81-9764-6BBEE99A1C59}" type="datetimeFigureOut">
               <a:rPr lang="en-US" smtClean="0"/>
-              <a:t>1/23/2020</a:t>
+              <a:t>1/26/2020</a:t>
             </a:fld>
             <a:endParaRPr lang="en-US"/>
           </a:p>
@@ -1836,7 +1841,7 @@
           <a:p>
             <a:fld id="{BD43FDEE-31B2-4A81-9764-6BBEE99A1C59}" type="datetimeFigureOut">
               <a:rPr lang="en-US" smtClean="0"/>
-              <a:t>1/23/2020</a:t>
+              <a:t>1/26/2020</a:t>
             </a:fld>
             <a:endParaRPr lang="en-US"/>
           </a:p>
@@ -1977,7 +1982,7 @@
           <a:p>
             <a:fld id="{BD43FDEE-31B2-4A81-9764-6BBEE99A1C59}" type="datetimeFigureOut">
               <a:rPr lang="en-US" smtClean="0"/>
-              <a:t>1/23/2020</a:t>
+              <a:t>1/26/2020</a:t>
             </a:fld>
             <a:endParaRPr lang="en-US"/>
           </a:p>
@@ -2090,7 +2095,7 @@
           <a:p>
             <a:fld id="{BD43FDEE-31B2-4A81-9764-6BBEE99A1C59}" type="datetimeFigureOut">
               <a:rPr lang="en-US" smtClean="0"/>
-              <a:t>1/23/2020</a:t>
+              <a:t>1/26/2020</a:t>
             </a:fld>
             <a:endParaRPr lang="en-US"/>
           </a:p>
@@ -2401,7 +2406,7 @@
           <a:p>
             <a:fld id="{BD43FDEE-31B2-4A81-9764-6BBEE99A1C59}" type="datetimeFigureOut">
               <a:rPr lang="en-US" smtClean="0"/>
-              <a:t>1/23/2020</a:t>
+              <a:t>1/26/2020</a:t>
             </a:fld>
             <a:endParaRPr lang="en-US"/>
           </a:p>
@@ -2689,7 +2694,7 @@
           <a:p>
             <a:fld id="{BD43FDEE-31B2-4A81-9764-6BBEE99A1C59}" type="datetimeFigureOut">
               <a:rPr lang="en-US" smtClean="0"/>
-              <a:t>1/23/2020</a:t>
+              <a:t>1/26/2020</a:t>
             </a:fld>
             <a:endParaRPr lang="en-US"/>
           </a:p>
@@ -2930,7 +2935,7 @@
           <a:p>
             <a:fld id="{BD43FDEE-31B2-4A81-9764-6BBEE99A1C59}" type="datetimeFigureOut">
               <a:rPr lang="en-US" smtClean="0"/>
-              <a:t>1/23/2020</a:t>
+              <a:t>1/26/2020</a:t>
             </a:fld>
             <a:endParaRPr lang="en-US"/>
           </a:p>
@@ -3361,7 +3366,7 @@
         </p:nvSpPr>
         <p:spPr>
           <a:xfrm>
-            <a:off x="5448051" y="2212820"/>
+            <a:off x="5448051" y="2228862"/>
             <a:ext cx="1295898" cy="647949"/>
           </a:xfrm>
           <a:prstGeom prst="rect">
@@ -3417,7 +3422,7 @@
         </p:nvSpPr>
         <p:spPr>
           <a:xfrm>
-            <a:off x="2699288" y="449737"/>
+            <a:off x="2699288" y="465779"/>
             <a:ext cx="6793424" cy="1388361"/>
           </a:xfrm>
         </p:spPr>
@@ -3471,7 +3476,7 @@
         </p:nvSpPr>
         <p:spPr>
           <a:xfrm>
-            <a:off x="2869768" y="2349811"/>
+            <a:off x="2869768" y="2365853"/>
             <a:ext cx="6452461" cy="1771359"/>
           </a:xfrm>
         </p:spPr>
@@ -3504,7 +3509,7 @@
               <a:rPr lang="en-US" b="1" dirty="0">
                 <a:latin typeface="Karla" charset="0"/>
               </a:rPr>
-              <a:t>Advance Practical Data Science</a:t>
+              <a:t>Advanced Practical Data Science</a:t>
             </a:r>
           </a:p>
           <a:p>
@@ -3555,7 +3560,7 @@
         </p:blipFill>
         <p:spPr>
           <a:xfrm>
-            <a:off x="4558370" y="4632883"/>
+            <a:off x="4558370" y="4616841"/>
             <a:ext cx="3075258" cy="1859976"/>
           </a:xfrm>
           <a:prstGeom prst="rect">
@@ -3753,7 +3758,7 @@
         </p:blipFill>
         <p:spPr>
           <a:xfrm>
-            <a:off x="12357349" y="4635632"/>
+            <a:off x="12405475" y="5071500"/>
             <a:ext cx="3075258" cy="1859976"/>
           </a:xfrm>
           <a:prstGeom prst="rect">
@@ -4045,7 +4050,7 @@
               <a:rPr lang="en-US" b="1" dirty="0">
                 <a:latin typeface="Karla" charset="0"/>
               </a:rPr>
-              <a:t>Advance Practical Data Science</a:t>
+              <a:t>Advanced Practical Data Science</a:t>
             </a:r>
           </a:p>
           <a:p>
@@ -4617,7 +4622,7 @@
               <a:rPr lang="en-US" b="1" dirty="0">
                 <a:latin typeface="Karla" charset="0"/>
               </a:rPr>
-              <a:t>Advance Practical Data Science</a:t>
+              <a:t>Advanced Practical Data Science</a:t>
             </a:r>
           </a:p>
           <a:p>
@@ -5451,7 +5456,7 @@
               <a:rPr lang="en-US" b="1" dirty="0">
                 <a:latin typeface="Karla" charset="0"/>
               </a:rPr>
-              <a:t>Advance Practical Data Science</a:t>
+              <a:t>Advanced Practical Data Science</a:t>
             </a:r>
           </a:p>
           <a:p>
@@ -5510,6 +5515,60 @@
       </p:grpSpPr>
       <p:sp>
         <p:nvSpPr>
+          <p:cNvPr id="80" name="Rectangle 79">
+            <a:extLst>
+              <a:ext uri="{FF2B5EF4-FFF2-40B4-BE49-F238E27FC236}">
+                <a16:creationId xmlns:a16="http://schemas.microsoft.com/office/drawing/2014/main" id="{F72C0834-730E-49C2-9D37-19EEB4202255}"/>
+              </a:ext>
+            </a:extLst>
+          </p:cNvPr>
+          <p:cNvSpPr/>
+          <p:nvPr/>
+        </p:nvSpPr>
+        <p:spPr>
+          <a:xfrm>
+            <a:off x="6305672" y="5179135"/>
+            <a:ext cx="5124701" cy="647949"/>
+          </a:xfrm>
+          <a:prstGeom prst="rect">
+            <a:avLst/>
+          </a:prstGeom>
+          <a:solidFill>
+            <a:srgbClr val="00B0F0"/>
+          </a:solidFill>
+          <a:ln>
+            <a:solidFill>
+              <a:srgbClr val="0070C0"/>
+            </a:solidFill>
+          </a:ln>
+        </p:spPr>
+        <p:style>
+          <a:lnRef idx="2">
+            <a:schemeClr val="accent1">
+              <a:shade val="50000"/>
+            </a:schemeClr>
+          </a:lnRef>
+          <a:fillRef idx="1">
+            <a:schemeClr val="accent1"/>
+          </a:fillRef>
+          <a:effectRef idx="0">
+            <a:schemeClr val="accent1"/>
+          </a:effectRef>
+          <a:fontRef idx="minor">
+            <a:schemeClr val="lt1"/>
+          </a:fontRef>
+        </p:style>
+        <p:txBody>
+          <a:bodyPr rtlCol="0" anchor="ctr"/>
+          <a:lstStyle/>
+          <a:p>
+            <a:pPr algn="ctr"/>
+            <a:endParaRPr lang="en-US" dirty="0"/>
+          </a:p>
+        </p:txBody>
+      </p:sp>
+      <p:sp>
+        <p:nvSpPr>
           <p:cNvPr id="81" name="Rectangle 80">
             <a:extLst>
               <a:ext uri="{FF2B5EF4-FFF2-40B4-BE49-F238E27FC236}">
@@ -5530,15 +5589,15 @@
             <a:gdLst>
               <a:gd name="connsiteX0" fmla="*/ 0 w 3828801"/>
               <a:gd name="connsiteY0" fmla="*/ 0 h 584775"/>
-              <a:gd name="connsiteX1" fmla="*/ 714710 w 3828801"/>
+              <a:gd name="connsiteX1" fmla="*/ 599845 w 3828801"/>
               <a:gd name="connsiteY1" fmla="*/ 0 h 584775"/>
-              <a:gd name="connsiteX2" fmla="*/ 1391131 w 3828801"/>
+              <a:gd name="connsiteX2" fmla="*/ 1123115 w 3828801"/>
               <a:gd name="connsiteY2" fmla="*/ 0 h 584775"/>
-              <a:gd name="connsiteX3" fmla="*/ 2067553 w 3828801"/>
+              <a:gd name="connsiteX3" fmla="*/ 1837824 w 3828801"/>
               <a:gd name="connsiteY3" fmla="*/ 0 h 584775"/>
-              <a:gd name="connsiteX4" fmla="*/ 2590822 w 3828801"/>
+              <a:gd name="connsiteX4" fmla="*/ 2437670 w 3828801"/>
               <a:gd name="connsiteY4" fmla="*/ 0 h 584775"/>
-              <a:gd name="connsiteX5" fmla="*/ 3152379 w 3828801"/>
+              <a:gd name="connsiteX5" fmla="*/ 3037515 w 3828801"/>
               <a:gd name="connsiteY5" fmla="*/ 0 h 584775"/>
               <a:gd name="connsiteX6" fmla="*/ 3828801 w 3828801"/>
               <a:gd name="connsiteY6" fmla="*/ 0 h 584775"/>
@@ -5548,11 +5607,11 @@
               <a:gd name="connsiteY8" fmla="*/ 584775 h 584775"/>
               <a:gd name="connsiteX9" fmla="*/ 2667398 w 3828801"/>
               <a:gd name="connsiteY9" fmla="*/ 584775 h 584775"/>
-              <a:gd name="connsiteX10" fmla="*/ 2144129 w 3828801"/>
+              <a:gd name="connsiteX10" fmla="*/ 2029265 w 3828801"/>
               <a:gd name="connsiteY10" fmla="*/ 584775 h 584775"/>
-              <a:gd name="connsiteX11" fmla="*/ 1467707 w 3828801"/>
+              <a:gd name="connsiteX11" fmla="*/ 1391131 w 3828801"/>
               <a:gd name="connsiteY11" fmla="*/ 584775 h 584775"/>
-              <a:gd name="connsiteX12" fmla="*/ 906150 w 3828801"/>
+              <a:gd name="connsiteX12" fmla="*/ 791286 w 3828801"/>
               <a:gd name="connsiteY12" fmla="*/ 584775 h 584775"/>
               <a:gd name="connsiteX13" fmla="*/ 0 w 3828801"/>
               <a:gd name="connsiteY13" fmla="*/ 584775 h 584775"/>
@@ -5609,83 +5668,7 @@
             </a:cxnLst>
             <a:rect l="l" t="t" r="r" b="b"/>
             <a:pathLst>
-              <a:path w="3828801" h="584775" fill="none" extrusionOk="0">
-                <a:moveTo>
-                  <a:pt x="0" y="0"/>
-                </a:moveTo>
-                <a:cubicBezTo>
-                  <a:pt x="348003" y="-20745"/>
-                  <a:pt x="367434" y="27532"/>
-                  <a:pt x="714710" y="0"/>
-                </a:cubicBezTo>
-                <a:cubicBezTo>
-                  <a:pt x="1061986" y="-27532"/>
-                  <a:pt x="1066457" y="-7668"/>
-                  <a:pt x="1391131" y="0"/>
-                </a:cubicBezTo>
-                <a:cubicBezTo>
-                  <a:pt x="1715805" y="7668"/>
-                  <a:pt x="1897352" y="-31783"/>
-                  <a:pt x="2067553" y="0"/>
-                </a:cubicBezTo>
-                <a:cubicBezTo>
-                  <a:pt x="2237754" y="31783"/>
-                  <a:pt x="2443578" y="9100"/>
-                  <a:pt x="2590822" y="0"/>
-                </a:cubicBezTo>
-                <a:cubicBezTo>
-                  <a:pt x="2738066" y="-9100"/>
-                  <a:pt x="2948803" y="21392"/>
-                  <a:pt x="3152379" y="0"/>
-                </a:cubicBezTo>
-                <a:cubicBezTo>
-                  <a:pt x="3355955" y="-21392"/>
-                  <a:pt x="3531707" y="-32995"/>
-                  <a:pt x="3828801" y="0"/>
-                </a:cubicBezTo>
-                <a:cubicBezTo>
-                  <a:pt x="3847120" y="145862"/>
-                  <a:pt x="3808109" y="433896"/>
-                  <a:pt x="3828801" y="584775"/>
-                </a:cubicBezTo>
-                <a:cubicBezTo>
-                  <a:pt x="3633808" y="585971"/>
-                  <a:pt x="3497714" y="596897"/>
-                  <a:pt x="3190668" y="584775"/>
-                </a:cubicBezTo>
-                <a:cubicBezTo>
-                  <a:pt x="2883622" y="572653"/>
-                  <a:pt x="2788161" y="585870"/>
-                  <a:pt x="2667398" y="584775"/>
-                </a:cubicBezTo>
-                <a:cubicBezTo>
-                  <a:pt x="2546635" y="583681"/>
-                  <a:pt x="2313184" y="572839"/>
-                  <a:pt x="2144129" y="584775"/>
-                </a:cubicBezTo>
-                <a:cubicBezTo>
-                  <a:pt x="1975074" y="596711"/>
-                  <a:pt x="1798810" y="567035"/>
-                  <a:pt x="1467707" y="584775"/>
-                </a:cubicBezTo>
-                <a:cubicBezTo>
-                  <a:pt x="1136604" y="602515"/>
-                  <a:pt x="1135156" y="604702"/>
-                  <a:pt x="906150" y="584775"/>
-                </a:cubicBezTo>
-                <a:cubicBezTo>
-                  <a:pt x="677144" y="564848"/>
-                  <a:pt x="375882" y="604932"/>
-                  <a:pt x="0" y="584775"/>
-                </a:cubicBezTo>
-                <a:cubicBezTo>
-                  <a:pt x="-6303" y="445539"/>
-                  <a:pt x="-13732" y="241777"/>
-                  <a:pt x="0" y="0"/>
-                </a:cubicBezTo>
-                <a:close/>
-              </a:path>
-              <a:path w="3828801" h="584775" stroke="0" extrusionOk="0">
+              <a:path w="3828801" h="584775" extrusionOk="0">
                 <a:moveTo>
                   <a:pt x="0" y="0"/>
                 </a:moveTo>
@@ -5765,7 +5748,9 @@
           </a:custGeom>
           <a:noFill/>
           <a:ln>
-            <a:noFill/>
+            <a:solidFill>
+              <a:schemeClr val="bg1"/>
+            </a:solidFill>
             <a:extLst>
               <a:ext uri="{C807C97D-BFC1-408E-A445-0C87EB9F89A2}">
                 <ask:lineSketchStyleProps xmlns:ask="http://schemas.microsoft.com/office/drawing/2018/sketchyshapes" sd="1219033472">
@@ -5789,18 +5774,18 @@
             <a:r>
               <a:rPr lang="en-US" b="1" dirty="0">
                 <a:solidFill>
-                  <a:srgbClr val="0070C0"/>
+                  <a:schemeClr val="bg1"/>
                 </a:solidFill>
                 <a:latin typeface="Karla" charset="0"/>
               </a:rPr>
-              <a:t>Advance Practical Data Science</a:t>
+              <a:t>Advanced Practical Data Science</a:t>
             </a:r>
           </a:p>
           <a:p>
             <a:r>
               <a:rPr lang="en-US" sz="1400" b="1" dirty="0" err="1">
                 <a:solidFill>
-                  <a:srgbClr val="0070C0"/>
+                  <a:schemeClr val="bg1"/>
                 </a:solidFill>
                 <a:latin typeface="Karla" charset="0"/>
               </a:rPr>
@@ -5809,7 +5794,7 @@
             <a:r>
               <a:rPr lang="en-US" sz="1400" b="1" dirty="0">
                 <a:solidFill>
-                  <a:srgbClr val="0070C0"/>
+                  <a:schemeClr val="bg1"/>
                 </a:solidFill>
                 <a:latin typeface="Karla" charset="0"/>
               </a:rPr>
@@ -5818,7 +5803,7 @@
             <a:r>
               <a:rPr lang="en-US" sz="1400" b="1" dirty="0" err="1">
                 <a:solidFill>
-                  <a:srgbClr val="0070C0"/>
+                  <a:schemeClr val="bg1"/>
                 </a:solidFill>
                 <a:latin typeface="Karla" charset="0"/>
               </a:rPr>
@@ -5826,7 +5811,7 @@
             </a:r>
             <a:endParaRPr lang="en-US" sz="1000" b="1" dirty="0">
               <a:solidFill>
-                <a:srgbClr val="0070C0"/>
+                <a:schemeClr val="bg1"/>
               </a:solidFill>
             </a:endParaRPr>
           </a:p>
@@ -6171,7 +6156,7 @@
                 </a:solidFill>
                 <a:latin typeface="Karla" charset="0"/>
               </a:rPr>
-              <a:t>Advance Practical Data Science</a:t>
+              <a:t>Advanced Practical Data Science</a:t>
             </a:r>
           </a:p>
           <a:p>
@@ -6589,7 +6574,7 @@
               <a:rPr lang="en-US" b="1" dirty="0">
                 <a:latin typeface="Karla" charset="0"/>
               </a:rPr>
-              <a:t>Advance Practical Data Science</a:t>
+              <a:t>Advanced Practical Data Science</a:t>
             </a:r>
           </a:p>
           <a:p>
@@ -7215,7 +7200,7 @@
                 </a:solidFill>
                 <a:latin typeface="Karla" charset="0"/>
               </a:rPr>
-              <a:t>Advance Practical Data Science</a:t>
+              <a:t>Advanced Practical Data Science</a:t>
             </a:r>
           </a:p>
           <a:p>
@@ -7849,7 +7834,7 @@
                 </a:solidFill>
                 <a:latin typeface="Karla" charset="0"/>
               </a:rPr>
-              <a:t>Advance Practical Data Science</a:t>
+              <a:t>Advanced Practical Data Science</a:t>
             </a:r>
           </a:p>
           <a:p>
@@ -8474,7 +8459,7 @@
               <a:rPr lang="en-US" b="1" dirty="0">
                 <a:latin typeface="Karla" charset="0"/>
               </a:rPr>
-              <a:t>Advance Practical Data Science</a:t>
+              <a:t>Advanced Practical Data Science</a:t>
             </a:r>
           </a:p>
           <a:p>
@@ -9137,7 +9122,7 @@
               <a:rPr lang="en-US" b="1" dirty="0">
                 <a:latin typeface="Karla" charset="0"/>
               </a:rPr>
-              <a:t>Advance Practical Data Science</a:t>
+              <a:t>Advanced Practical Data Science</a:t>
             </a:r>
           </a:p>
           <a:p>
@@ -9715,7 +9700,7 @@
               <a:rPr lang="en-US" b="1" dirty="0">
                 <a:latin typeface="Karla" charset="0"/>
               </a:rPr>
-              <a:t>Advance Practical Data Science</a:t>
+              <a:t>Advanced Practical Data Science</a:t>
             </a:r>
           </a:p>
           <a:p>
@@ -10406,7 +10391,7 @@
                 </a:solidFill>
                 <a:latin typeface="Karla" charset="0"/>
               </a:rPr>
-              <a:t>Advance Practical Data Science</a:t>
+              <a:t>Advanced Practical Data Science</a:t>
             </a:r>
           </a:p>
           <a:p>
@@ -10997,7 +10982,7 @@
               <a:rPr lang="en-US" b="1" dirty="0">
                 <a:latin typeface="Karla" charset="0"/>
               </a:rPr>
-              <a:t>Advance Practical Data Science</a:t>
+              <a:t>Advanced Practical Data Science</a:t>
             </a:r>
           </a:p>
           <a:p>
@@ -11575,7 +11560,7 @@
               <a:rPr lang="en-US" b="1" dirty="0">
                 <a:latin typeface="Karla" charset="0"/>
               </a:rPr>
-              <a:t>Advance Practical Data Science</a:t>
+              <a:t>Advanced Practical Data Science</a:t>
             </a:r>
           </a:p>
           <a:p>
@@ -12150,7 +12135,7 @@
                 </a:solidFill>
                 <a:latin typeface="Karla" charset="0"/>
               </a:rPr>
-              <a:t>Advance Practical Data Science</a:t>
+              <a:t>Advanced Practical Data Science</a:t>
             </a:r>
           </a:p>
           <a:p>
@@ -12719,58 +12704,6 @@
               </a:solidFill>
               <a:latin typeface="Karla" charset="0"/>
             </a:endParaRPr>
-          </a:p>
-        </p:txBody>
-      </p:sp>
-      <p:sp>
-        <p:nvSpPr>
-          <p:cNvPr id="80" name="Rectangle 79">
-            <a:extLst>
-              <a:ext uri="{FF2B5EF4-FFF2-40B4-BE49-F238E27FC236}">
-                <a16:creationId xmlns:a16="http://schemas.microsoft.com/office/drawing/2014/main" id="{F72C0834-730E-49C2-9D37-19EEB4202255}"/>
-              </a:ext>
-            </a:extLst>
-          </p:cNvPr>
-          <p:cNvSpPr/>
-          <p:nvPr/>
-        </p:nvSpPr>
-        <p:spPr>
-          <a:xfrm>
-            <a:off x="6305672" y="5179135"/>
-            <a:ext cx="5124701" cy="647949"/>
-          </a:xfrm>
-          <a:prstGeom prst="rect">
-            <a:avLst/>
-          </a:prstGeom>
-          <a:noFill/>
-          <a:ln>
-            <a:solidFill>
-              <a:srgbClr val="0070C0"/>
-            </a:solidFill>
-          </a:ln>
-        </p:spPr>
-        <p:style>
-          <a:lnRef idx="2">
-            <a:schemeClr val="accent1">
-              <a:shade val="50000"/>
-            </a:schemeClr>
-          </a:lnRef>
-          <a:fillRef idx="1">
-            <a:schemeClr val="accent1"/>
-          </a:fillRef>
-          <a:effectRef idx="0">
-            <a:schemeClr val="accent1"/>
-          </a:effectRef>
-          <a:fontRef idx="minor">
-            <a:schemeClr val="lt1"/>
-          </a:fontRef>
-        </p:style>
-        <p:txBody>
-          <a:bodyPr rtlCol="0" anchor="ctr"/>
-          <a:lstStyle/>
-          <a:p>
-            <a:pPr algn="ctr"/>
-            <a:endParaRPr lang="en-US" dirty="0"/>
           </a:p>
         </p:txBody>
       </p:sp>
@@ -13490,7 +13423,7 @@
                 </a:solidFill>
                 <a:latin typeface="Karla" charset="0"/>
               </a:rPr>
-              <a:t>Advance Practical Data Science</a:t>
+              <a:t>Advanced Practical Data Science</a:t>
             </a:r>
           </a:p>
           <a:p>
@@ -14609,7 +14542,7 @@
                 </a:solidFill>
                 <a:latin typeface="Karla" charset="0"/>
               </a:rPr>
-              <a:t>Advance Practical Data Science</a:t>
+              <a:t>Advanced Practical Data Science</a:t>
             </a:r>
           </a:p>
           <a:p>
@@ -14916,7 +14849,7 @@
               <a:rPr lang="en-US" sz="2400" dirty="0">
                 <a:latin typeface="Karla" panose="020F0502020204030204" pitchFamily="2" charset="0"/>
               </a:rPr>
-              <a:t>&gt; Get good job &lt;</a:t>
+              <a:t>&gt; Get a good job &lt;</a:t>
             </a:r>
           </a:p>
           <a:p>
@@ -15723,7 +15656,7 @@
                 </a:solidFill>
                 <a:latin typeface="Karla" charset="0"/>
               </a:rPr>
-              <a:t>Advance Practical Data Science</a:t>
+              <a:t>Advanced Practical Data Science</a:t>
             </a:r>
           </a:p>
           <a:p>
@@ -16030,7 +15963,7 @@
               <a:rPr lang="en-US" sz="2400" dirty="0">
                 <a:latin typeface="Karla" panose="020F0502020204030204" pitchFamily="2" charset="0"/>
               </a:rPr>
-              <a:t>&gt; Get good job</a:t>
+              <a:t>&gt; Get a good job</a:t>
             </a:r>
           </a:p>
           <a:p>

</xml_diff>